<commit_message>
minor modifications in presentation ppt.
</commit_message>
<xml_diff>
--- a/presentation/Presentation.pptx
+++ b/presentation/Presentation.pptx
@@ -378,7 +378,7 @@
           <a:p>
             <a:fld id="{6EE7A52F-9D89-7442-A8E9-48D1527B5F6B}" type="datetimeFigureOut">
               <a:rPr lang="en-US" smtClean="0"/>
-              <a:t>4/22/2021</a:t>
+              <a:t>4/25/21</a:t>
             </a:fld>
             <a:endParaRPr lang="en-US" dirty="0"/>
           </a:p>
@@ -12352,7 +12352,7 @@
             <a:fld id="{6FCA8E82-58CD-E045-8B98-B7A85B79B752}" type="datetime4">
               <a:rPr lang="en-US" smtClean="0"/>
               <a:pPr/>
-              <a:t>April 22, 2021</a:t>
+              <a:t>April 25, 2021</a:t>
             </a:fld>
             <a:endParaRPr lang="en-US" dirty="0">
               <a:latin typeface="+mn-lt"/>
@@ -13020,7 +13020,15 @@
           <a:p>
             <a:r>
               <a:rPr lang="en-US" dirty="0"/>
-              <a:t>Aditya</a:t>
+              <a:t>Aditya </a:t>
+            </a:r>
+            <a:r>
+              <a:rPr lang="en-US" dirty="0" err="1"/>
+              <a:t>Saripalli</a:t>
+            </a:r>
+            <a:r>
+              <a:rPr lang="en-US" dirty="0"/>
+              <a:t>   (20173071)</a:t>
             </a:r>
           </a:p>
           <a:p>
@@ -13030,7 +13038,7 @@
             </a:r>
             <a:r>
               <a:rPr lang="en-US" dirty="0"/>
-              <a:t> Balaji (20163051)</a:t>
+              <a:t> Balaji         (20163051)</a:t>
             </a:r>
           </a:p>
           <a:p>
@@ -13084,14 +13092,29 @@
             <p:ph type="title"/>
           </p:nvPr>
         </p:nvSpPr>
-        <p:spPr/>
+        <p:spPr>
+          <a:xfrm>
+            <a:off x="964024" y="879063"/>
+            <a:ext cx="6403728" cy="610863"/>
+          </a:xfrm>
+        </p:spPr>
         <p:txBody>
-          <a:bodyPr/>
+          <a:bodyPr>
+            <a:normAutofit fontScale="90000"/>
+          </a:bodyPr>
           <a:lstStyle/>
           <a:p>
             <a:r>
+              <a:rPr lang="en-US" b="0" dirty="0" err="1"/>
+              <a:t>R.K.Arora</a:t>
+            </a:r>
+            <a:r>
               <a:rPr lang="en-US" b="0" dirty="0"/>
-              <a:t>Arora and Gupta’s</a:t>
+              <a:t> and </a:t>
+            </a:r>
+            <a:r>
+              <a:rPr lang="en-US" b="0" dirty="0" err="1"/>
+              <a:t>M.N.Gupta’s</a:t>
             </a:r>
             <a:endParaRPr lang="en-US" dirty="0"/>
           </a:p>
@@ -13148,7 +13171,7 @@
         </p:blipFill>
         <p:spPr>
           <a:xfrm>
-            <a:off x="4888476" y="1422952"/>
+            <a:off x="4888476" y="1528052"/>
             <a:ext cx="6909593" cy="2072723"/>
           </a:xfrm>
           <a:prstGeom prst="rect">
@@ -13172,7 +13195,7 @@
         </p:blipFill>
         <p:spPr>
           <a:xfrm>
-            <a:off x="31228" y="3108877"/>
+            <a:off x="31228" y="3213977"/>
             <a:ext cx="5921784" cy="2187248"/>
           </a:xfrm>
           <a:prstGeom prst="rect">
@@ -13196,7 +13219,7 @@
         </p:blipFill>
         <p:spPr>
           <a:xfrm>
-            <a:off x="5953012" y="4049314"/>
+            <a:off x="5963522" y="4753504"/>
             <a:ext cx="5845057" cy="2008674"/>
           </a:xfrm>
           <a:prstGeom prst="rect">
@@ -13250,14 +13273,29 @@
             <p:ph type="title"/>
           </p:nvPr>
         </p:nvSpPr>
-        <p:spPr/>
+        <p:spPr>
+          <a:xfrm>
+            <a:off x="964023" y="879063"/>
+            <a:ext cx="6855674" cy="610863"/>
+          </a:xfrm>
+        </p:spPr>
         <p:txBody>
-          <a:bodyPr/>
+          <a:bodyPr>
+            <a:normAutofit fontScale="90000"/>
+          </a:bodyPr>
           <a:lstStyle/>
           <a:p>
             <a:r>
+              <a:rPr lang="en-US" b="0" dirty="0" err="1"/>
+              <a:t>R.K.Arora</a:t>
+            </a:r>
+            <a:r>
               <a:rPr lang="en-US" b="0" dirty="0"/>
-              <a:t>Arora and Gupta’s</a:t>
+              <a:t> and </a:t>
+            </a:r>
+            <a:r>
+              <a:rPr lang="en-US" b="0" dirty="0" err="1"/>
+              <a:t>M.N.Gupta’s</a:t>
             </a:r>
             <a:endParaRPr lang="en-US" dirty="0"/>
           </a:p>
@@ -13315,7 +13353,7 @@
         <p:spPr>
           <a:xfrm>
             <a:off x="961790" y="2247900"/>
-            <a:ext cx="10523074" cy="2680715"/>
+            <a:ext cx="10523074" cy="3731037"/>
           </a:xfrm>
           <a:prstGeom prst="rect">
             <a:avLst/>
@@ -13490,81 +13528,20 @@
           <a:p>
             <a:r>
               <a:rPr lang="en-US" dirty="0"/>
-              <a:t>The </a:t>
-            </a:r>
-            <a:r>
-              <a:rPr lang="en-US" dirty="0" smtClean="0"/>
-              <a:t>detection-message is </a:t>
-            </a:r>
+              <a:t>The detection-message is issued only when the process and all its communicating neighbors become PASSIVE.</a:t>
+            </a:r>
+          </a:p>
+          <a:p>
             <a:r>
               <a:rPr lang="en-US" dirty="0"/>
-              <a:t>issued </a:t>
-            </a:r>
-            <a:r>
-              <a:rPr lang="en-US" dirty="0" smtClean="0"/>
-              <a:t>only </a:t>
-            </a:r>
+              <a:t>The detection message wave once issued by the root process first spreads downwards and then contracts upwards.</a:t>
+            </a:r>
+          </a:p>
+          <a:p>
             <a:r>
               <a:rPr lang="en-US" dirty="0"/>
-              <a:t>when </a:t>
-            </a:r>
-            <a:r>
-              <a:rPr lang="en-US" dirty="0" smtClean="0"/>
-              <a:t>the process </a:t>
-            </a:r>
-            <a:r>
-              <a:rPr lang="en-US" dirty="0"/>
-              <a:t>and all its communicating </a:t>
-            </a:r>
-            <a:r>
-              <a:rPr lang="en-US" dirty="0" smtClean="0"/>
-              <a:t>neighbors become passive.</a:t>
-            </a:r>
-          </a:p>
-          <a:p>
-            <a:r>
-              <a:rPr lang="en-US" dirty="0"/>
-              <a:t>The </a:t>
-            </a:r>
-            <a:r>
-              <a:rPr lang="en-US" dirty="0" smtClean="0"/>
-              <a:t>detection message wave </a:t>
-            </a:r>
-            <a:r>
-              <a:rPr lang="en-US" dirty="0"/>
-              <a:t>once issued by the root process </a:t>
-            </a:r>
-            <a:r>
-              <a:rPr lang="en-US" dirty="0" smtClean="0"/>
-              <a:t>first spreads </a:t>
-            </a:r>
-            <a:r>
-              <a:rPr lang="en-US" dirty="0"/>
-              <a:t>downwards and then contracts upwards</a:t>
-            </a:r>
-            <a:r>
-              <a:rPr lang="en-US" dirty="0" smtClean="0"/>
-              <a:t>.</a:t>
-            </a:r>
-          </a:p>
-          <a:p>
-            <a:r>
-              <a:rPr lang="en-US" dirty="0"/>
-              <a:t>no extra effort is required to </a:t>
-            </a:r>
-            <a:r>
-              <a:rPr lang="en-US" dirty="0" smtClean="0"/>
-              <a:t>maintain the </a:t>
-            </a:r>
-            <a:r>
-              <a:rPr lang="en-US" dirty="0"/>
-              <a:t>local information in the control section of a process</a:t>
-            </a:r>
-            <a:r>
-              <a:rPr lang="en-US" dirty="0" smtClean="0"/>
-              <a:t>.</a:t>
-            </a:r>
-            <a:endParaRPr lang="en-US" dirty="0"/>
+              <a:t>No additional effort is required to maintain the local information in the control section of a process.</a:t>
+            </a:r>
           </a:p>
         </p:txBody>
       </p:sp>
@@ -13620,10 +13597,9 @@
           <a:lstStyle/>
           <a:p>
             <a:r>
-              <a:rPr lang="en-US" b="0" dirty="0" smtClean="0"/>
+              <a:rPr lang="en-US" b="0" dirty="0"/>
               <a:t>Our Model</a:t>
             </a:r>
-            <a:endParaRPr lang="en-US" b="0" dirty="0"/>
           </a:p>
         </p:txBody>
       </p:sp>
@@ -13646,7 +13622,7 @@
         <p:spPr>
           <a:xfrm>
             <a:off x="961791" y="2216210"/>
-            <a:ext cx="3819760" cy="3315909"/>
+            <a:ext cx="4314402" cy="3648562"/>
           </a:xfrm>
         </p:spPr>
         <p:txBody>
@@ -13658,14 +13634,17 @@
               <a:buChar char="•"/>
             </a:pPr>
             <a:r>
-              <a:rPr lang="en-US" dirty="0" smtClean="0"/>
-              <a:t>We use the same model as Rodney </a:t>
-            </a:r>
-            <a:r>
-              <a:rPr lang="en-US" dirty="0" err="1" smtClean="0"/>
-              <a:t>Topor’s</a:t>
-            </a:r>
-            <a:endParaRPr lang="en-US" dirty="0" smtClean="0"/>
+              <a:rPr lang="en-US" sz="2000" dirty="0"/>
+              <a:t>We have used </a:t>
+            </a:r>
+            <a:r>
+              <a:rPr lang="en-US" sz="2000" dirty="0" err="1"/>
+              <a:t>Rodney.W.Topor’s</a:t>
+            </a:r>
+            <a:r>
+              <a:rPr lang="en-US" sz="2000" dirty="0"/>
+              <a:t> model for termination detection</a:t>
+            </a:r>
           </a:p>
           <a:p>
             <a:pPr marL="342900" indent="-342900">
@@ -13673,8 +13652,8 @@
               <a:buChar char="•"/>
             </a:pPr>
             <a:r>
-              <a:rPr lang="en-US" dirty="0" smtClean="0"/>
-              <a:t>Additionally we maintain the Routing array apart along with token.</a:t>
+              <a:rPr lang="en-US" sz="2000" dirty="0"/>
+              <a:t>In addition to the above algorithm, we maintain a routing array for message passing.</a:t>
             </a:r>
           </a:p>
           <a:p>
@@ -13683,10 +13662,9 @@
               <a:buChar char="•"/>
             </a:pPr>
             <a:r>
-              <a:rPr lang="en-US" dirty="0" smtClean="0"/>
-              <a:t>Repeat is done only for the nodes that is still active and not all by using the route path.</a:t>
-            </a:r>
-            <a:endParaRPr lang="en-US" dirty="0"/>
+              <a:rPr lang="en-US" sz="2000" dirty="0"/>
+              <a:t>Messages are sent only along the edges of the nodes using the routing path mentioned in the array.</a:t>
+            </a:r>
           </a:p>
         </p:txBody>
       </p:sp>
@@ -13765,8 +13743,8 @@
         </p:blipFill>
         <p:spPr>
           <a:xfrm>
-            <a:off x="4781550" y="1862627"/>
-            <a:ext cx="6761894" cy="4233373"/>
+            <a:off x="5559972" y="1862628"/>
+            <a:ext cx="5983472" cy="3746032"/>
           </a:xfrm>
           <a:prstGeom prst="rect">
             <a:avLst/>
@@ -13825,7 +13803,7 @@
           <a:lstStyle/>
           <a:p>
             <a:r>
-              <a:rPr lang="en-US" b="0" dirty="0" err="1" smtClean="0"/>
+              <a:rPr lang="en-US" b="0" dirty="0" err="1"/>
               <a:t>Comparision</a:t>
             </a:r>
             <a:endParaRPr lang="en-US" b="0" dirty="0"/>
@@ -13854,7 +13832,7 @@
           <a:lstStyle/>
           <a:p>
             <a:r>
-              <a:rPr lang="en-US" dirty="0" err="1" smtClean="0"/>
+              <a:rPr lang="en-US" dirty="0" err="1"/>
               <a:t>Topor</a:t>
             </a:r>
             <a:endParaRPr lang="en-US" dirty="0"/>
@@ -13888,28 +13866,27 @@
           <a:lstStyle/>
           <a:p>
             <a:r>
-              <a:rPr lang="en-US" dirty="0" smtClean="0"/>
+              <a:rPr lang="en-US" dirty="0"/>
               <a:t>Simple</a:t>
             </a:r>
           </a:p>
           <a:p>
             <a:r>
-              <a:rPr lang="en-US" dirty="0" smtClean="0"/>
+              <a:rPr lang="en-US" dirty="0"/>
               <a:t>More messages</a:t>
             </a:r>
           </a:p>
           <a:p>
             <a:r>
-              <a:rPr lang="en-US" dirty="0" smtClean="0"/>
+              <a:rPr lang="en-US" dirty="0"/>
               <a:t>Frequent Repeats</a:t>
             </a:r>
           </a:p>
           <a:p>
             <a:r>
-              <a:rPr lang="en-US" dirty="0" smtClean="0"/>
+              <a:rPr lang="en-US" dirty="0"/>
               <a:t>Complete env repeats for even one black token</a:t>
             </a:r>
-            <a:endParaRPr lang="en-US" dirty="0"/>
           </a:p>
           <a:p>
             <a:pPr marL="0" indent="0">
@@ -13944,10 +13921,9 @@
           <a:lstStyle/>
           <a:p>
             <a:r>
-              <a:rPr lang="en-US" dirty="0" smtClean="0"/>
+              <a:rPr lang="en-US" dirty="0"/>
               <a:t>Message Optimal</a:t>
             </a:r>
-            <a:endParaRPr lang="en-US" dirty="0"/>
           </a:p>
         </p:txBody>
       </p:sp>
@@ -13980,20 +13956,19 @@
           <a:lstStyle/>
           <a:p>
             <a:r>
-              <a:rPr lang="en-US" dirty="0" smtClean="0"/>
+              <a:rPr lang="en-US" dirty="0"/>
               <a:t>Less message overheads and message traffic</a:t>
             </a:r>
           </a:p>
           <a:p>
             <a:r>
-              <a:rPr lang="en-US" dirty="0" smtClean="0"/>
+              <a:rPr lang="en-US" dirty="0"/>
               <a:t>Mostly waiting for other nodes to go to idle.</a:t>
             </a:r>
-            <a:endParaRPr lang="en-US" dirty="0"/>
-          </a:p>
-          <a:p>
-            <a:r>
-              <a:rPr lang="en-US" dirty="0" smtClean="0"/>
+          </a:p>
+          <a:p>
+            <a:r>
+              <a:rPr lang="en-US" dirty="0"/>
               <a:t>In Arora’s method even waiting for neighborhood nodes to become passive</a:t>
             </a:r>
           </a:p>
@@ -14021,10 +13996,9 @@
           <a:lstStyle/>
           <a:p>
             <a:r>
-              <a:rPr lang="en-US" dirty="0" smtClean="0"/>
+              <a:rPr lang="en-US" dirty="0"/>
               <a:t>Our model</a:t>
             </a:r>
-            <a:endParaRPr lang="en-US" dirty="0"/>
           </a:p>
         </p:txBody>
       </p:sp>
@@ -14052,24 +14026,9 @@
           <a:lstStyle/>
           <a:p>
             <a:r>
-              <a:rPr lang="en-US" dirty="0" smtClean="0"/>
-              <a:t>Comparatively Simple after initialization</a:t>
-            </a:r>
-          </a:p>
-          <a:p>
-            <a:r>
-              <a:rPr lang="en-US" dirty="0" smtClean="0"/>
-              <a:t>Lesser message</a:t>
-            </a:r>
-          </a:p>
-          <a:p>
-            <a:r>
-              <a:rPr lang="en-US" dirty="0" smtClean="0"/>
-              <a:t>Only repeat is applied to the nodes which invoked later and not entire env repeated.</a:t>
-            </a:r>
-          </a:p>
-          <a:p>
-            <a:endParaRPr lang="en-US" dirty="0"/>
+              <a:rPr lang="en-US" dirty="0"/>
+              <a:t>Comparatively Simple after initialization.</a:t>
+            </a:r>
           </a:p>
           <a:p>
             <a:pPr marL="0" indent="0">
@@ -14190,7 +14149,7 @@
                 <a16:creationId xmlns:a16="http://schemas.microsoft.com/office/drawing/2014/main" id="{EC944911-7CDD-41CC-A7F0-5B0CF85D545C}"/>
               </a:ext>
               <a:ext uri="{C183D7F6-B498-43B3-948B-1728B52AA6E4}">
-                <adec:decorative xmlns:adec="http://schemas.microsoft.com/office/drawing/2017/decorative" xmlns="" val="0"/>
+                <adec:decorative xmlns:adec="http://schemas.microsoft.com/office/drawing/2017/decorative" val="0"/>
               </a:ext>
             </a:extLst>
           </p:cNvPr>
@@ -14487,18 +14446,18 @@
               <a:t>03. </a:t>
             </a:r>
             <a:r>
-              <a:rPr lang="en-US" sz="1600" dirty="0" err="1" smtClean="0"/>
+              <a:rPr lang="en-US" sz="1600" dirty="0" err="1"/>
               <a:t>Chandrasekaran</a:t>
             </a:r>
-            <a:endParaRPr lang="en-US" sz="1600" dirty="0" smtClean="0"/>
-          </a:p>
-          <a:p>
-            <a:r>
-              <a:rPr lang="en-US" sz="1600" dirty="0" smtClean="0"/>
+            <a:endParaRPr lang="en-US" sz="1600" dirty="0"/>
+          </a:p>
+          <a:p>
+            <a:r>
+              <a:rPr lang="en-US" sz="1600" dirty="0"/>
               <a:t>And </a:t>
             </a:r>
             <a:r>
-              <a:rPr lang="en-US" sz="1600" dirty="0" err="1" smtClean="0"/>
+              <a:rPr lang="en-US" sz="1600" dirty="0" err="1"/>
               <a:t>Venkatesan’s</a:t>
             </a:r>
             <a:endParaRPr lang="en-US" sz="1600" dirty="0"/>
@@ -14751,7 +14710,7 @@
           <a:lstStyle/>
           <a:p>
             <a:r>
-              <a:rPr lang="en-US" b="0" dirty="0" smtClean="0"/>
+              <a:rPr lang="en-US" b="0" dirty="0"/>
               <a:t>Assumption</a:t>
             </a:r>
             <a:endParaRPr lang="en-US" dirty="0"/>
@@ -14824,22 +14783,22 @@
           <a:p>
             <a:pPr lvl="1" indent="-342900"/>
             <a:r>
-              <a:rPr lang="en-US" sz="2800" dirty="0" smtClean="0"/>
+              <a:rPr lang="en-US" sz="2800" dirty="0"/>
               <a:t>Minimum spanning tree (path) is known</a:t>
             </a:r>
           </a:p>
           <a:p>
             <a:pPr lvl="1" indent="-342900"/>
             <a:r>
-              <a:rPr lang="en-US" sz="2800" dirty="0" smtClean="0"/>
+              <a:rPr lang="en-US" sz="2800" dirty="0"/>
               <a:t>Nodes are available and not modified.</a:t>
             </a:r>
           </a:p>
           <a:p>
             <a:pPr lvl="1" indent="-342900"/>
             <a:r>
-              <a:rPr lang="en-US" sz="2800" dirty="0" smtClean="0"/>
-              <a:t>No new channels are established.</a:t>
+              <a:rPr lang="en-US" sz="2800" dirty="0"/>
+              <a:t>No new channels (other than the edges of the MST) are established.</a:t>
             </a:r>
             <a:endParaRPr lang="en-US" dirty="0"/>
           </a:p>
@@ -14947,29 +14906,21 @@
             </a:r>
             <a:r>
               <a:rPr lang="en-US" dirty="0"/>
-              <a:t> , </a:t>
-            </a:r>
-            <a:r>
-              <a:rPr lang="en-US" dirty="0" smtClean="0"/>
-              <a:t>0 ≤ </a:t>
-            </a:r>
-            <a:r>
-              <a:rPr lang="en-US" dirty="0" err="1" smtClean="0"/>
+              <a:t> , 0 ≤ </a:t>
+            </a:r>
+            <a:r>
+              <a:rPr lang="en-US" dirty="0" err="1"/>
               <a:t>i</a:t>
             </a:r>
             <a:r>
-              <a:rPr lang="en-US" dirty="0" smtClean="0"/>
-              <a:t> ≤N</a:t>
-            </a:r>
-            <a:r>
               <a:rPr lang="en-US" dirty="0"/>
-              <a:t>, which are modeled as the nodes </a:t>
-            </a:r>
-            <a:r>
-              <a:rPr lang="en-US" dirty="0" err="1" smtClean="0"/>
+              <a:t> ≤N, which are modeled as the nodes </a:t>
+            </a:r>
+            <a:r>
+              <a:rPr lang="en-US" dirty="0" err="1"/>
               <a:t>i</a:t>
             </a:r>
-            <a:endParaRPr lang="en-US" dirty="0" smtClean="0"/>
+            <a:endParaRPr lang="en-US" dirty="0"/>
           </a:p>
           <a:p>
             <a:pPr marL="342900" indent="-342900">
@@ -14978,11 +14929,7 @@
             </a:pPr>
             <a:r>
               <a:rPr lang="en-US" dirty="0"/>
-              <a:t>edges of the graph represent the communication channels</a:t>
-            </a:r>
-            <a:r>
-              <a:rPr lang="en-US" dirty="0" smtClean="0"/>
-              <a:t>.</a:t>
+              <a:t>edges of the graph represent the communication channels.</a:t>
             </a:r>
           </a:p>
           <a:p>
@@ -14991,16 +14938,8 @@
               <a:buChar char="•"/>
             </a:pPr>
             <a:r>
-              <a:rPr lang="en-US" dirty="0" smtClean="0"/>
-              <a:t>Children report </a:t>
-            </a:r>
-            <a:r>
               <a:rPr lang="en-US" dirty="0"/>
-              <a:t>to their parents, if they have </a:t>
-            </a:r>
-            <a:r>
-              <a:rPr lang="en-US" dirty="0" smtClean="0"/>
-              <a:t>terminated.</a:t>
+              <a:t>Children report to their parents, if they have terminated.</a:t>
             </a:r>
           </a:p>
           <a:p>
@@ -15009,24 +14948,8 @@
               <a:buChar char="•"/>
             </a:pPr>
             <a:r>
-              <a:rPr lang="en-US" dirty="0" smtClean="0"/>
-              <a:t>parent </a:t>
-            </a:r>
-            <a:r>
               <a:rPr lang="en-US" dirty="0"/>
-              <a:t>node will similarly report to its parent when it has </a:t>
-            </a:r>
-            <a:r>
-              <a:rPr lang="en-US" dirty="0" smtClean="0"/>
-              <a:t>completed processing </a:t>
-            </a:r>
-            <a:r>
-              <a:rPr lang="en-US" dirty="0"/>
-              <a:t>and all of its immediate children have </a:t>
-            </a:r>
-            <a:r>
-              <a:rPr lang="en-US" dirty="0" smtClean="0"/>
-              <a:t>terminated</a:t>
+              <a:t>parent node will similarly report to its parent when it has completed processing and all of its immediate children have terminated</a:t>
             </a:r>
           </a:p>
           <a:p>
@@ -15035,7 +14958,7 @@
               <a:buChar char="•"/>
             </a:pPr>
             <a:r>
-              <a:rPr lang="en-US" dirty="0" smtClean="0"/>
+              <a:rPr lang="en-US" dirty="0"/>
               <a:t>Algorithm terminated when root terminates.</a:t>
             </a:r>
           </a:p>
@@ -15167,44 +15090,15 @@
           <a:p>
             <a:r>
               <a:rPr lang="en-US" dirty="0"/>
-              <a:t>Problem with the </a:t>
-            </a:r>
-            <a:r>
-              <a:rPr lang="en-US" dirty="0" smtClean="0"/>
-              <a:t>algorithm</a:t>
+              <a:t>Problem with the algorithm:</a:t>
             </a:r>
             <a:br>
-              <a:rPr lang="en-US" dirty="0" smtClean="0"/>
+              <a:rPr lang="en-US" dirty="0"/>
             </a:br>
             <a:r>
               <a:rPr lang="en-US" dirty="0"/>
-              <a:t>fails </a:t>
-            </a:r>
-            <a:r>
-              <a:rPr lang="en-US" dirty="0" smtClean="0"/>
-              <a:t>when </a:t>
-            </a:r>
-            <a:r>
-              <a:rPr lang="en-US" dirty="0"/>
-              <a:t>a process after </a:t>
-            </a:r>
-            <a:r>
-              <a:rPr lang="en-US" dirty="0" smtClean="0"/>
-              <a:t>it has </a:t>
-            </a:r>
-            <a:r>
-              <a:rPr lang="en-US" dirty="0"/>
-              <a:t>sent a token to its </a:t>
-            </a:r>
-            <a:r>
-              <a:rPr lang="en-US" dirty="0" smtClean="0"/>
-              <a:t>parent, </a:t>
-            </a:r>
-            <a:r>
-              <a:rPr lang="en-US" dirty="0"/>
-              <a:t>receives a message from some other process</a:t>
-            </a:r>
-            <a:endParaRPr lang="en-US" dirty="0"/>
+              <a:t>The algorithm fails when a process (after it has sent a token to its parent), receives a message from some other process.</a:t>
+            </a:r>
           </a:p>
         </p:txBody>
       </p:sp>
@@ -15302,18 +15196,21 @@
             <p:ph type="title"/>
           </p:nvPr>
         </p:nvSpPr>
-        <p:spPr/>
+        <p:spPr>
+          <a:xfrm>
+            <a:off x="971550" y="1040238"/>
+            <a:ext cx="4941477" cy="610863"/>
+          </a:xfrm>
+        </p:spPr>
         <p:txBody>
-          <a:bodyPr/>
+          <a:bodyPr>
+            <a:normAutofit/>
+          </a:bodyPr>
           <a:lstStyle/>
           <a:p>
             <a:r>
-              <a:rPr lang="en-US" b="0" dirty="0"/>
-              <a:t>Rodney </a:t>
-            </a:r>
-            <a:r>
               <a:rPr lang="en-US" b="0" dirty="0" err="1"/>
-              <a:t>Topor's</a:t>
+              <a:t>Rodney.W.Topor’s</a:t>
             </a:r>
             <a:endParaRPr lang="en-US" b="0" dirty="0"/>
           </a:p>
@@ -15337,8 +15234,8 @@
         </p:nvSpPr>
         <p:spPr>
           <a:xfrm>
-            <a:off x="961790" y="2216210"/>
-            <a:ext cx="4643481" cy="3315909"/>
+            <a:off x="1275211" y="2195404"/>
+            <a:ext cx="5783055" cy="3659073"/>
           </a:xfrm>
         </p:spPr>
         <p:txBody>
@@ -15351,11 +15248,7 @@
             </a:pPr>
             <a:r>
               <a:rPr lang="en-US" dirty="0"/>
-              <a:t>to color the processes and </a:t>
-            </a:r>
-            <a:r>
-              <a:rPr lang="en-US" dirty="0" smtClean="0"/>
-              <a:t>tokens, all initially white. </a:t>
+              <a:t>Initially color all the processes and tokens as WHITE.</a:t>
             </a:r>
           </a:p>
           <a:p>
@@ -15364,32 +15257,8 @@
               <a:buChar char="•"/>
             </a:pPr>
             <a:r>
-              <a:rPr lang="en-US" dirty="0" smtClean="0"/>
-              <a:t>process </a:t>
-            </a:r>
-            <a:r>
               <a:rPr lang="en-US" dirty="0"/>
-              <a:t>turns black when it sends a message to some other </a:t>
-            </a:r>
-            <a:r>
-              <a:rPr lang="en-US" dirty="0" smtClean="0"/>
-              <a:t>process</a:t>
-            </a:r>
-            <a:r>
-              <a:rPr lang="en-US" dirty="0"/>
-              <a:t> </a:t>
-            </a:r>
-            <a:r>
-              <a:rPr lang="en-US" dirty="0" smtClean="0"/>
-              <a:t>and turns </a:t>
-            </a:r>
-            <a:r>
-              <a:rPr lang="en-US" dirty="0"/>
-              <a:t>to white, after it has sent a black token to </a:t>
-            </a:r>
-            <a:r>
-              <a:rPr lang="en-US" dirty="0" smtClean="0"/>
-              <a:t>its parent.</a:t>
+              <a:t>A process turns BLACK when it sends a message to some other process. It turns WHITE, after it has sent the BLACK token to its parent.</a:t>
             </a:r>
           </a:p>
           <a:p>
@@ -15398,16 +15267,8 @@
               <a:buChar char="•"/>
             </a:pPr>
             <a:r>
-              <a:rPr lang="en-US" dirty="0" smtClean="0"/>
-              <a:t>upon </a:t>
-            </a:r>
-            <a:r>
               <a:rPr lang="en-US" dirty="0"/>
-              <a:t>receiving </a:t>
-            </a:r>
-            <a:r>
-              <a:rPr lang="en-US" dirty="0" smtClean="0"/>
-              <a:t>a black token root will send a repeat to all its children propagating to leaf.</a:t>
+              <a:t>Upon receiving a BLACK token (from one of the child(s)) Root will send a REPEAT signal to all its children propagating till leaf node.</a:t>
             </a:r>
           </a:p>
           <a:p>
@@ -15417,11 +15278,7 @@
             </a:pPr>
             <a:r>
               <a:rPr lang="en-US" dirty="0"/>
-              <a:t>The leaf nodes restart the algorithm on receiving the Repeat signal</a:t>
-            </a:r>
-            <a:r>
-              <a:rPr lang="en-US" dirty="0" smtClean="0"/>
-              <a:t>.</a:t>
+              <a:t>The leaf nodes then restart the algorithm on receiving the REPEAT signal.</a:t>
             </a:r>
           </a:p>
           <a:p>
@@ -15431,13 +15288,8 @@
             </a:pPr>
             <a:r>
               <a:rPr lang="en-US" dirty="0"/>
-              <a:t>root concludes that </a:t>
-            </a:r>
-            <a:r>
-              <a:rPr lang="en-US" dirty="0" smtClean="0"/>
-              <a:t>termination only on receiving white token</a:t>
-            </a:r>
-            <a:endParaRPr lang="en-US" dirty="0"/>
+              <a:t>Root node concludes that termination detection is complete only on receiving WHITE tokens from all the child nodes.</a:t>
+            </a:r>
           </a:p>
         </p:txBody>
       </p:sp>
@@ -15492,8 +15344,8 @@
         </p:blipFill>
         <p:spPr>
           <a:xfrm>
-            <a:off x="6150565" y="1425918"/>
-            <a:ext cx="5497546" cy="4312946"/>
+            <a:off x="7386051" y="1959930"/>
+            <a:ext cx="4392919" cy="3450882"/>
           </a:xfrm>
           <a:prstGeom prst="rect">
             <a:avLst/>
@@ -15677,6 +15529,13 @@
               <a:rPr lang="en-US" sz="3200" dirty="0"/>
               <a:t>.</a:t>
             </a:r>
+            <a:br>
+              <a:rPr lang="en-US" sz="3200" dirty="0"/>
+            </a:br>
+            <a:r>
+              <a:rPr lang="en-US" sz="3200" dirty="0"/>
+              <a:t>(Expand a little and explain the performance numbers)</a:t>
+            </a:r>
           </a:p>
           <a:p>
             <a:pPr marL="342900" indent="-342900"/>
@@ -15743,16 +15602,16 @@
           <a:lstStyle/>
           <a:p>
             <a:r>
-              <a:rPr lang="en-US" sz="4000" b="0" dirty="0" err="1" smtClean="0"/>
-              <a:t>Chandrasekaran</a:t>
-            </a:r>
-            <a:r>
-              <a:rPr lang="en-US" sz="4000" b="0" dirty="0" smtClean="0"/>
+              <a:rPr lang="en-US" sz="4000" b="0" dirty="0" err="1"/>
+              <a:t>S.Chandrasekaran</a:t>
+            </a:r>
+            <a:r>
+              <a:rPr lang="en-US" sz="4000" b="0" dirty="0"/>
               <a:t> And </a:t>
             </a:r>
             <a:r>
-              <a:rPr lang="en-US" sz="4000" b="0" dirty="0" err="1" smtClean="0"/>
-              <a:t>Venkatesan’s</a:t>
+              <a:rPr lang="en-US" sz="4000" b="0" dirty="0" err="1"/>
+              <a:t>S.Venkatesan’s</a:t>
             </a:r>
             <a:endParaRPr lang="en-US" sz="4000" b="0" dirty="0"/>
           </a:p>
@@ -15812,8 +15671,8 @@
         </p:nvSpPr>
         <p:spPr>
           <a:xfrm>
-            <a:off x="6281928" y="2099560"/>
-            <a:ext cx="5294376" cy="3203959"/>
+            <a:off x="5843752" y="2194153"/>
+            <a:ext cx="6216028" cy="4480311"/>
           </a:xfrm>
           <a:prstGeom prst="rect">
             <a:avLst/>
@@ -15823,13 +15682,33 @@
           <a:bodyPr/>
           <a:lstStyle/>
           <a:p>
+            <a:pPr>
+              <a:lnSpc>
+                <a:spcPct val="150000"/>
+              </a:lnSpc>
+            </a:pPr>
             <a:r>
               <a:rPr lang="en-US" sz="1800" dirty="0"/>
-              <a:t>when </a:t>
-            </a:r>
-            <a:r>
-              <a:rPr lang="en-US" sz="1800" dirty="0" smtClean="0"/>
-              <a:t>a node </a:t>
+              <a:t>An extension of </a:t>
+            </a:r>
+            <a:r>
+              <a:rPr lang="en-US" sz="1800" dirty="0" err="1"/>
+              <a:t>Rodney.W.Topor</a:t>
+            </a:r>
+            <a:r>
+              <a:rPr lang="en-US" sz="1800" dirty="0"/>
+              <a:t>.</a:t>
+            </a:r>
+          </a:p>
+          <a:p>
+            <a:pPr>
+              <a:lnSpc>
+                <a:spcPct val="100000"/>
+              </a:lnSpc>
+            </a:pPr>
+            <a:r>
+              <a:rPr lang="en-US" sz="1800" dirty="0"/>
+              <a:t>When a node </a:t>
             </a:r>
             <a:r>
               <a:rPr lang="en-US" sz="1800" i="1" dirty="0"/>
@@ -15864,38 +15743,35 @@
               <a:t>should wait until </a:t>
             </a:r>
             <a:r>
+              <a:rPr lang="en-US" sz="1800" b="1" i="1" dirty="0"/>
+              <a:t>q</a:t>
+            </a:r>
+            <a:r>
+              <a:rPr lang="en-US" sz="1800" i="1" dirty="0"/>
+              <a:t> </a:t>
+            </a:r>
+            <a:r>
+              <a:rPr lang="en-US" sz="1800" dirty="0"/>
+              <a:t>becomes idle.</a:t>
+            </a:r>
+          </a:p>
+          <a:p>
+            <a:pPr>
+              <a:lnSpc>
+                <a:spcPct val="100000"/>
+              </a:lnSpc>
+            </a:pPr>
+            <a:r>
+              <a:rPr lang="en-US" sz="1800" dirty="0"/>
+              <a:t>When the node </a:t>
+            </a:r>
+            <a:r>
               <a:rPr lang="en-US" sz="1800" i="1" dirty="0"/>
               <a:t>q </a:t>
             </a:r>
             <a:r>
               <a:rPr lang="en-US" sz="1800" dirty="0"/>
-              <a:t>becomes </a:t>
-            </a:r>
-            <a:r>
-              <a:rPr lang="en-US" sz="1800" dirty="0" smtClean="0"/>
-              <a:t>idle</a:t>
-            </a:r>
-          </a:p>
-          <a:p>
-            <a:r>
-              <a:rPr lang="en-US" sz="1800" dirty="0"/>
-              <a:t>when node </a:t>
-            </a:r>
-            <a:r>
-              <a:rPr lang="en-US" sz="1800" i="1" dirty="0"/>
-              <a:t>q </a:t>
-            </a:r>
-            <a:r>
-              <a:rPr lang="en-US" sz="1800" dirty="0"/>
-              <a:t>terminates, it sends an acknowledgement (</a:t>
-            </a:r>
-            <a:r>
-              <a:rPr lang="en-US" sz="1800" dirty="0" smtClean="0"/>
-              <a:t>a control </a:t>
-            </a:r>
-            <a:r>
-              <a:rPr lang="en-US" sz="1800" dirty="0"/>
-              <a:t>message) to node </a:t>
+              <a:t>terminates, it sends an acknowledgement (a CONTROL message) to node </a:t>
             </a:r>
             <a:r>
               <a:rPr lang="en-US" sz="1800" i="1" dirty="0"/>
@@ -15906,23 +15782,43 @@
               <a:t>informing node </a:t>
             </a:r>
             <a:r>
-              <a:rPr lang="en-US" sz="1800" i="1" dirty="0" smtClean="0"/>
+              <a:rPr lang="en-US" sz="1800" i="1" dirty="0"/>
               <a:t>p</a:t>
             </a:r>
           </a:p>
           <a:p>
-            <a:r>
-              <a:rPr lang="en-US" sz="1800" dirty="0" smtClean="0"/>
-              <a:t>both the sender and the receiver keep track of each message</a:t>
-            </a:r>
-            <a:endParaRPr lang="en-US" sz="1800" i="1" dirty="0" smtClean="0"/>
-          </a:p>
-          <a:p>
-            <a:r>
-              <a:rPr lang="en-US" sz="1800" dirty="0" smtClean="0"/>
-              <a:t>All nodes will only send white token</a:t>
-            </a:r>
-            <a:endParaRPr lang="en-US" sz="1800" dirty="0"/>
+            <a:pPr>
+              <a:lnSpc>
+                <a:spcPct val="100000"/>
+              </a:lnSpc>
+            </a:pPr>
+            <a:r>
+              <a:rPr lang="en-US" sz="1800" dirty="0"/>
+              <a:t>Both the sender and the receiver keep track of each message exchange.</a:t>
+            </a:r>
+            <a:endParaRPr lang="en-US" sz="1800" i="1" dirty="0"/>
+          </a:p>
+          <a:p>
+            <a:pPr>
+              <a:lnSpc>
+                <a:spcPct val="150000"/>
+              </a:lnSpc>
+            </a:pPr>
+            <a:r>
+              <a:rPr lang="en-US" sz="1800" dirty="0"/>
+              <a:t>All nodes will only send WHITE token.</a:t>
+            </a:r>
+          </a:p>
+          <a:p>
+            <a:pPr>
+              <a:lnSpc>
+                <a:spcPct val="150000"/>
+              </a:lnSpc>
+            </a:pPr>
+            <a:r>
+              <a:rPr lang="en-US" sz="1800" dirty="0"/>
+              <a:t>A message optimal way of termination detection.</a:t>
+            </a:r>
           </a:p>
         </p:txBody>
       </p:sp>
@@ -15942,8 +15838,8 @@
         </p:blipFill>
         <p:spPr>
           <a:xfrm>
-            <a:off x="1494790" y="2377440"/>
-            <a:ext cx="3181865" cy="2777738"/>
+            <a:off x="1578873" y="1933683"/>
+            <a:ext cx="3791913" cy="3310304"/>
           </a:xfrm>
           <a:prstGeom prst="rect">
             <a:avLst/>
@@ -16029,7 +15925,6 @@
               <a:rPr lang="en-US" b="0" dirty="0"/>
               <a:t>Performance</a:t>
             </a:r>
-            <a:endParaRPr lang="en-US" b="0" dirty="0"/>
           </a:p>
         </p:txBody>
       </p:sp>
@@ -16055,14 +15950,13 @@
           <a:lstStyle/>
           <a:p>
             <a:r>
-              <a:rPr lang="en-US" dirty="0" err="1" smtClean="0"/>
+              <a:rPr lang="en-US" dirty="0" err="1"/>
               <a:t>Topor’s</a:t>
             </a:r>
             <a:r>
-              <a:rPr lang="en-US" dirty="0" smtClean="0"/>
+              <a:rPr lang="en-US" dirty="0"/>
               <a:t> model</a:t>
             </a:r>
-            <a:endParaRPr lang="en-US" dirty="0"/>
           </a:p>
         </p:txBody>
       </p:sp>
@@ -16093,10 +15987,9 @@
           <a:lstStyle/>
           <a:p>
             <a:r>
-              <a:rPr lang="en-US" dirty="0" smtClean="0"/>
+              <a:rPr lang="en-US" dirty="0"/>
               <a:t>Worse Case Message Complexity O(N*M)</a:t>
             </a:r>
-            <a:endParaRPr lang="en-US" dirty="0"/>
           </a:p>
           <a:p>
             <a:pPr marL="0" indent="0">
@@ -16131,10 +16024,9 @@
           <a:lstStyle/>
           <a:p>
             <a:r>
-              <a:rPr lang="en-US" dirty="0" smtClean="0"/>
+              <a:rPr lang="en-US" dirty="0"/>
               <a:t>Message Optimal</a:t>
             </a:r>
-            <a:endParaRPr lang="en-US" dirty="0"/>
           </a:p>
         </p:txBody>
       </p:sp>
@@ -16168,42 +16060,29 @@
           <a:p>
             <a:r>
               <a:rPr lang="en-US" dirty="0"/>
-              <a:t>the total number of messages generated by the algorithm is 2* |E| </a:t>
-            </a:r>
-            <a:r>
-              <a:rPr lang="en-US" dirty="0" smtClean="0"/>
-              <a:t>+ |</a:t>
-            </a:r>
+              <a:t>the total number of messages generated by the algorithm is 2* |E| + |V| − 1 + M.</a:t>
+            </a:r>
+          </a:p>
+          <a:p>
+            <a:pPr lvl="1"/>
             <a:r>
               <a:rPr lang="en-US" dirty="0"/>
-              <a:t>V| − 1 + M</a:t>
-            </a:r>
-            <a:r>
-              <a:rPr lang="en-US" dirty="0" smtClean="0"/>
-              <a:t>.</a:t>
+              <a:t>E edges – links / warning messages</a:t>
             </a:r>
           </a:p>
           <a:p>
             <a:pPr lvl="1"/>
             <a:r>
-              <a:rPr lang="en-US" dirty="0" smtClean="0"/>
-              <a:t>E edges – links / warning messages</a:t>
+              <a:rPr lang="en-US" dirty="0"/>
+              <a:t>M remove message</a:t>
             </a:r>
           </a:p>
           <a:p>
             <a:pPr lvl="1"/>
             <a:r>
-              <a:rPr lang="en-US" dirty="0" smtClean="0"/>
-              <a:t>M remove message</a:t>
-            </a:r>
-          </a:p>
-          <a:p>
-            <a:pPr lvl="1"/>
-            <a:r>
-              <a:rPr lang="en-US" dirty="0" smtClean="0"/>
+              <a:rPr lang="en-US" dirty="0"/>
               <a:t>V nodes</a:t>
             </a:r>
-            <a:endParaRPr lang="en-US" dirty="0"/>
           </a:p>
           <a:p>
             <a:r>
@@ -16214,21 +16093,12 @@
               <a:rPr lang="pt-BR" dirty="0"/>
               <a:t>O(|E| + M) </a:t>
             </a:r>
-            <a:endParaRPr lang="pt-BR" dirty="0" smtClean="0"/>
           </a:p>
           <a:p>
             <a:pPr lvl="1"/>
             <a:r>
-              <a:rPr lang="pt-BR" dirty="0" smtClean="0"/>
-              <a:t>as </a:t>
-            </a:r>
-            <a:r>
               <a:rPr lang="pt-BR" dirty="0"/>
-              <a:t>|E| &gt; |V</a:t>
-            </a:r>
-            <a:r>
-              <a:rPr lang="pt-BR" dirty="0" smtClean="0"/>
-              <a:t>|</a:t>
+              <a:t>as |E| &gt; |V|</a:t>
             </a:r>
             <a:endParaRPr lang="en-US" dirty="0"/>
           </a:p>
@@ -17075,12 +16945,12 @@
 </file>
 
 <file path=customXml/item1.xml><?xml version="1.0" encoding="utf-8"?>
-<p:properties xmlns:p="http://schemas.microsoft.com/office/2006/metadata/properties" xmlns:xsi="http://www.w3.org/2001/XMLSchema-instance" xmlns:pc="http://schemas.microsoft.com/office/infopath/2007/PartnerControls">
-  <documentManagement>
-    <Status xmlns="71af3243-3dd4-4a8d-8c0d-dd76da1f02a5">Not started</Status>
-    <MediaServiceKeyPoints xmlns="71af3243-3dd4-4a8d-8c0d-dd76da1f02a5" xsi:nil="true"/>
-  </documentManagement>
-</p:properties>
+<?mso-contentType ?>
+<FormTemplates xmlns="http://schemas.microsoft.com/sharepoint/v3/contenttype/forms">
+  <Display>DocumentLibraryForm</Display>
+  <Edit>DocumentLibraryForm</Edit>
+  <New>DocumentLibraryForm</New>
+</FormTemplates>
 </file>
 
 <file path=customXml/item2.xml><?xml version="1.0" encoding="utf-8"?>
@@ -17305,20 +17175,18 @@
 </file>
 
 <file path=customXml/item3.xml><?xml version="1.0" encoding="utf-8"?>
-<?mso-contentType ?>
-<FormTemplates xmlns="http://schemas.microsoft.com/sharepoint/v3/contenttype/forms">
-  <Display>DocumentLibraryForm</Display>
-  <Edit>DocumentLibraryForm</Edit>
-  <New>DocumentLibraryForm</New>
-</FormTemplates>
+<p:properties xmlns:p="http://schemas.microsoft.com/office/2006/metadata/properties" xmlns:xsi="http://www.w3.org/2001/XMLSchema-instance" xmlns:pc="http://schemas.microsoft.com/office/infopath/2007/PartnerControls">
+  <documentManagement>
+    <Status xmlns="71af3243-3dd4-4a8d-8c0d-dd76da1f02a5">Not started</Status>
+    <MediaServiceKeyPoints xmlns="71af3243-3dd4-4a8d-8c0d-dd76da1f02a5" xsi:nil="true"/>
+  </documentManagement>
+</p:properties>
 </file>
 
 <file path=customXml/itemProps1.xml><?xml version="1.0" encoding="utf-8"?>
-<ds:datastoreItem xmlns:ds="http://schemas.openxmlformats.org/officeDocument/2006/customXml" ds:itemID="{6CC8E66C-AC30-44BA-8882-3290DF968F1F}">
+<ds:datastoreItem xmlns:ds="http://schemas.openxmlformats.org/officeDocument/2006/customXml" ds:itemID="{F1446DA3-37A7-4516-A4F6-8B99D0D312BF}">
   <ds:schemaRefs>
-    <ds:schemaRef ds:uri="http://schemas.microsoft.com/office/2006/metadata/properties"/>
-    <ds:schemaRef ds:uri="http://schemas.microsoft.com/office/infopath/2007/PartnerControls"/>
-    <ds:schemaRef ds:uri="71af3243-3dd4-4a8d-8c0d-dd76da1f02a5"/>
+    <ds:schemaRef ds:uri="http://schemas.microsoft.com/sharepoint/v3/contenttype/forms"/>
   </ds:schemaRefs>
 </ds:datastoreItem>
 </file>
@@ -17343,9 +17211,11 @@
 </file>
 
 <file path=customXml/itemProps3.xml><?xml version="1.0" encoding="utf-8"?>
-<ds:datastoreItem xmlns:ds="http://schemas.openxmlformats.org/officeDocument/2006/customXml" ds:itemID="{F1446DA3-37A7-4516-A4F6-8B99D0D312BF}">
+<ds:datastoreItem xmlns:ds="http://schemas.openxmlformats.org/officeDocument/2006/customXml" ds:itemID="{6CC8E66C-AC30-44BA-8882-3290DF968F1F}">
   <ds:schemaRefs>
-    <ds:schemaRef ds:uri="http://schemas.microsoft.com/sharepoint/v3/contenttype/forms"/>
+    <ds:schemaRef ds:uri="http://schemas.microsoft.com/office/2006/metadata/properties"/>
+    <ds:schemaRef ds:uri="http://schemas.microsoft.com/office/infopath/2007/PartnerControls"/>
+    <ds:schemaRef ds:uri="71af3243-3dd4-4a8d-8c0d-dd76da1f02a5"/>
   </ds:schemaRefs>
 </ds:datastoreItem>
 </file>
</xml_diff>